<commit_message>
EOW Update 2024-09-27 Added table to Doppler section
</commit_message>
<xml_diff>
--- a/Slides/PH223_Lecture_04.pptx
+++ b/Slides/PH223_Lecture_04.pptx
@@ -5,7 +5,7 @@
     <p:sldMasterId id="2147483648" r:id="rId1"/>
   </p:sldMasterIdLst>
   <p:notesMasterIdLst>
-    <p:notesMasterId r:id="rId49"/>
+    <p:notesMasterId r:id="rId50"/>
   </p:notesMasterIdLst>
   <p:sldIdLst>
     <p:sldId id="276" r:id="rId2"/>
@@ -26,35 +26,36 @@
     <p:sldId id="258" r:id="rId17"/>
     <p:sldId id="259" r:id="rId18"/>
     <p:sldId id="1216" r:id="rId19"/>
-    <p:sldId id="1217" r:id="rId20"/>
-    <p:sldId id="408" r:id="rId21"/>
-    <p:sldId id="271" r:id="rId22"/>
-    <p:sldId id="1437" r:id="rId23"/>
-    <p:sldId id="1376" r:id="rId24"/>
-    <p:sldId id="1377" r:id="rId25"/>
-    <p:sldId id="1378" r:id="rId26"/>
-    <p:sldId id="275" r:id="rId27"/>
-    <p:sldId id="264" r:id="rId28"/>
-    <p:sldId id="1062" r:id="rId29"/>
-    <p:sldId id="1438" r:id="rId30"/>
-    <p:sldId id="1070" r:id="rId31"/>
-    <p:sldId id="418" r:id="rId32"/>
-    <p:sldId id="417" r:id="rId33"/>
-    <p:sldId id="564" r:id="rId34"/>
-    <p:sldId id="1069" r:id="rId35"/>
-    <p:sldId id="265" r:id="rId36"/>
-    <p:sldId id="267" r:id="rId37"/>
-    <p:sldId id="269" r:id="rId38"/>
-    <p:sldId id="1071" r:id="rId39"/>
-    <p:sldId id="1072" r:id="rId40"/>
-    <p:sldId id="1138" r:id="rId41"/>
-    <p:sldId id="1139" r:id="rId42"/>
-    <p:sldId id="1140" r:id="rId43"/>
-    <p:sldId id="1141" r:id="rId44"/>
-    <p:sldId id="274" r:id="rId45"/>
-    <p:sldId id="263" r:id="rId46"/>
-    <p:sldId id="1439" r:id="rId47"/>
-    <p:sldId id="270" r:id="rId48"/>
+    <p:sldId id="1440" r:id="rId20"/>
+    <p:sldId id="1217" r:id="rId21"/>
+    <p:sldId id="408" r:id="rId22"/>
+    <p:sldId id="271" r:id="rId23"/>
+    <p:sldId id="1437" r:id="rId24"/>
+    <p:sldId id="1376" r:id="rId25"/>
+    <p:sldId id="1377" r:id="rId26"/>
+    <p:sldId id="1378" r:id="rId27"/>
+    <p:sldId id="275" r:id="rId28"/>
+    <p:sldId id="264" r:id="rId29"/>
+    <p:sldId id="1062" r:id="rId30"/>
+    <p:sldId id="1438" r:id="rId31"/>
+    <p:sldId id="1070" r:id="rId32"/>
+    <p:sldId id="418" r:id="rId33"/>
+    <p:sldId id="417" r:id="rId34"/>
+    <p:sldId id="564" r:id="rId35"/>
+    <p:sldId id="1069" r:id="rId36"/>
+    <p:sldId id="265" r:id="rId37"/>
+    <p:sldId id="267" r:id="rId38"/>
+    <p:sldId id="269" r:id="rId39"/>
+    <p:sldId id="1071" r:id="rId40"/>
+    <p:sldId id="1072" r:id="rId41"/>
+    <p:sldId id="1138" r:id="rId42"/>
+    <p:sldId id="1139" r:id="rId43"/>
+    <p:sldId id="1140" r:id="rId44"/>
+    <p:sldId id="1141" r:id="rId45"/>
+    <p:sldId id="274" r:id="rId46"/>
+    <p:sldId id="263" r:id="rId47"/>
+    <p:sldId id="1439" r:id="rId48"/>
+    <p:sldId id="270" r:id="rId49"/>
   </p:sldIdLst>
   <p:sldSz cx="9144000" cy="6858000" type="screen4x3"/>
   <p:notesSz cx="6858000" cy="9144000"/>
@@ -175,7 +176,7 @@
 <file path=ppt/revisionInfo.xml><?xml version="1.0" encoding="utf-8"?>
 <p1510:revInfo xmlns:a="http://schemas.openxmlformats.org/drawingml/2006/main" xmlns:r="http://schemas.openxmlformats.org/officeDocument/2006/relationships" xmlns:p1510="http://schemas.microsoft.com/office/powerpoint/2015/10/main">
   <p1510:revLst>
-    <p1510:client id="{37CE7355-AB08-45C9-98F7-FC70C9DF7CF2}" v="9" dt="2023-09-18T14:18:03.851"/>
+    <p1510:client id="{2798568F-B1F6-47B2-A404-0ED5144EAF91}" v="7" dt="2024-09-19T16:25:56.130"/>
   </p1510:revLst>
 </p1510:revInfo>
 </file>
@@ -189,8 +190,8 @@
       <pc:docMkLst>
         <pc:docMk/>
       </pc:docMkLst>
-      <pc:sldChg chg="add">
-        <pc:chgData name="Lines, Todd" userId="afaf7c3a-e8aa-4568-882a-02ad8f9e19b0" providerId="ADAL" clId="{37CE7355-AB08-45C9-98F7-FC70C9DF7CF2}" dt="2023-09-15T01:03:56.938" v="28"/>
+      <pc:sldChg chg="del">
+        <pc:chgData name="Lines, Todd" userId="afaf7c3a-e8aa-4568-882a-02ad8f9e19b0" providerId="ADAL" clId="{37CE7355-AB08-45C9-98F7-FC70C9DF7CF2}" dt="2023-09-15T01:03:38.545" v="27" actId="2696"/>
         <pc:sldMkLst>
           <pc:docMk/>
           <pc:sldMk cId="2015820796" sldId="257"/>
@@ -200,28 +201,7 @@
         <pc:chgData name="Lines, Todd" userId="afaf7c3a-e8aa-4568-882a-02ad8f9e19b0" providerId="ADAL" clId="{37CE7355-AB08-45C9-98F7-FC70C9DF7CF2}" dt="2023-09-15T01:03:38.545" v="27" actId="2696"/>
         <pc:sldMkLst>
           <pc:docMk/>
-          <pc:sldMk cId="2015820796" sldId="257"/>
-        </pc:sldMkLst>
-      </pc:sldChg>
-      <pc:sldChg chg="add">
-        <pc:chgData name="Lines, Todd" userId="afaf7c3a-e8aa-4568-882a-02ad8f9e19b0" providerId="ADAL" clId="{37CE7355-AB08-45C9-98F7-FC70C9DF7CF2}" dt="2023-09-15T01:03:56.938" v="28"/>
-        <pc:sldMkLst>
-          <pc:docMk/>
           <pc:sldMk cId="1496941259" sldId="258"/>
-        </pc:sldMkLst>
-      </pc:sldChg>
-      <pc:sldChg chg="del">
-        <pc:chgData name="Lines, Todd" userId="afaf7c3a-e8aa-4568-882a-02ad8f9e19b0" providerId="ADAL" clId="{37CE7355-AB08-45C9-98F7-FC70C9DF7CF2}" dt="2023-09-15T01:03:38.545" v="27" actId="2696"/>
-        <pc:sldMkLst>
-          <pc:docMk/>
-          <pc:sldMk cId="1496941259" sldId="258"/>
-        </pc:sldMkLst>
-      </pc:sldChg>
-      <pc:sldChg chg="add">
-        <pc:chgData name="Lines, Todd" userId="afaf7c3a-e8aa-4568-882a-02ad8f9e19b0" providerId="ADAL" clId="{37CE7355-AB08-45C9-98F7-FC70C9DF7CF2}" dt="2023-09-15T01:03:56.938" v="28"/>
-        <pc:sldMkLst>
-          <pc:docMk/>
-          <pc:sldMk cId="1052569046" sldId="259"/>
         </pc:sldMkLst>
       </pc:sldChg>
       <pc:sldChg chg="del">
@@ -231,8 +211,8 @@
           <pc:sldMk cId="1052569046" sldId="259"/>
         </pc:sldMkLst>
       </pc:sldChg>
-      <pc:sldChg chg="del">
-        <pc:chgData name="Lines, Todd" userId="afaf7c3a-e8aa-4568-882a-02ad8f9e19b0" providerId="ADAL" clId="{37CE7355-AB08-45C9-98F7-FC70C9DF7CF2}" dt="2023-09-15T01:03:38.545" v="27" actId="2696"/>
+      <pc:sldChg chg="add">
+        <pc:chgData name="Lines, Todd" userId="afaf7c3a-e8aa-4568-882a-02ad8f9e19b0" providerId="ADAL" clId="{37CE7355-AB08-45C9-98F7-FC70C9DF7CF2}" dt="2023-09-15T01:03:56.938" v="28"/>
         <pc:sldMkLst>
           <pc:docMk/>
           <pc:sldMk cId="3346601855" sldId="260"/>
@@ -242,28 +222,7 @@
         <pc:chgData name="Lines, Todd" userId="afaf7c3a-e8aa-4568-882a-02ad8f9e19b0" providerId="ADAL" clId="{37CE7355-AB08-45C9-98F7-FC70C9DF7CF2}" dt="2023-09-15T01:03:56.938" v="28"/>
         <pc:sldMkLst>
           <pc:docMk/>
-          <pc:sldMk cId="3346601855" sldId="260"/>
-        </pc:sldMkLst>
-      </pc:sldChg>
-      <pc:sldChg chg="del">
-        <pc:chgData name="Lines, Todd" userId="afaf7c3a-e8aa-4568-882a-02ad8f9e19b0" providerId="ADAL" clId="{37CE7355-AB08-45C9-98F7-FC70C9DF7CF2}" dt="2023-09-15T01:03:38.545" v="27" actId="2696"/>
-        <pc:sldMkLst>
-          <pc:docMk/>
           <pc:sldMk cId="1282110421" sldId="261"/>
-        </pc:sldMkLst>
-      </pc:sldChg>
-      <pc:sldChg chg="add">
-        <pc:chgData name="Lines, Todd" userId="afaf7c3a-e8aa-4568-882a-02ad8f9e19b0" providerId="ADAL" clId="{37CE7355-AB08-45C9-98F7-FC70C9DF7CF2}" dt="2023-09-15T01:03:56.938" v="28"/>
-        <pc:sldMkLst>
-          <pc:docMk/>
-          <pc:sldMk cId="1282110421" sldId="261"/>
-        </pc:sldMkLst>
-      </pc:sldChg>
-      <pc:sldChg chg="del">
-        <pc:chgData name="Lines, Todd" userId="afaf7c3a-e8aa-4568-882a-02ad8f9e19b0" providerId="ADAL" clId="{37CE7355-AB08-45C9-98F7-FC70C9DF7CF2}" dt="2023-09-15T01:03:38.545" v="27" actId="2696"/>
-        <pc:sldMkLst>
-          <pc:docMk/>
-          <pc:sldMk cId="1038495166" sldId="262"/>
         </pc:sldMkLst>
       </pc:sldChg>
       <pc:sldChg chg="add">
@@ -308,25 +267,11 @@
           <pc:sldMk cId="0" sldId="271"/>
         </pc:sldMkLst>
       </pc:sldChg>
-      <pc:sldChg chg="del">
-        <pc:chgData name="Lines, Todd" userId="afaf7c3a-e8aa-4568-882a-02ad8f9e19b0" providerId="ADAL" clId="{37CE7355-AB08-45C9-98F7-FC70C9DF7CF2}" dt="2023-09-15T01:03:38.545" v="27" actId="2696"/>
-        <pc:sldMkLst>
-          <pc:docMk/>
-          <pc:sldMk cId="772486968" sldId="272"/>
-        </pc:sldMkLst>
-      </pc:sldChg>
       <pc:sldChg chg="add">
         <pc:chgData name="Lines, Todd" userId="afaf7c3a-e8aa-4568-882a-02ad8f9e19b0" providerId="ADAL" clId="{37CE7355-AB08-45C9-98F7-FC70C9DF7CF2}" dt="2023-09-15T01:03:56.938" v="28"/>
         <pc:sldMkLst>
           <pc:docMk/>
           <pc:sldMk cId="772486968" sldId="272"/>
-        </pc:sldMkLst>
-      </pc:sldChg>
-      <pc:sldChg chg="del">
-        <pc:chgData name="Lines, Todd" userId="afaf7c3a-e8aa-4568-882a-02ad8f9e19b0" providerId="ADAL" clId="{37CE7355-AB08-45C9-98F7-FC70C9DF7CF2}" dt="2023-09-15T01:03:38.545" v="27" actId="2696"/>
-        <pc:sldMkLst>
-          <pc:docMk/>
-          <pc:sldMk cId="339530994" sldId="273"/>
         </pc:sldMkLst>
       </pc:sldChg>
       <pc:sldChg chg="add">
@@ -678,6 +623,117 @@
       </pc:sldChg>
     </pc:docChg>
   </pc:docChgLst>
+  <pc:docChgLst>
+    <pc:chgData name="Lines, Todd" userId="afaf7c3a-e8aa-4568-882a-02ad8f9e19b0" providerId="ADAL" clId="{2798568F-B1F6-47B2-A404-0ED5144EAF91}"/>
+    <pc:docChg chg="custSel addSld modSld">
+      <pc:chgData name="Lines, Todd" userId="afaf7c3a-e8aa-4568-882a-02ad8f9e19b0" providerId="ADAL" clId="{2798568F-B1F6-47B2-A404-0ED5144EAF91}" dt="2024-09-19T16:29:30.439" v="120" actId="20577"/>
+      <pc:docMkLst>
+        <pc:docMk/>
+      </pc:docMkLst>
+      <pc:sldChg chg="modSp mod">
+        <pc:chgData name="Lines, Todd" userId="afaf7c3a-e8aa-4568-882a-02ad8f9e19b0" providerId="ADAL" clId="{2798568F-B1F6-47B2-A404-0ED5144EAF91}" dt="2024-09-19T16:29:30.439" v="120" actId="20577"/>
+        <pc:sldMkLst>
+          <pc:docMk/>
+          <pc:sldMk cId="0" sldId="1217"/>
+        </pc:sldMkLst>
+        <pc:spChg chg="mod">
+          <ac:chgData name="Lines, Todd" userId="afaf7c3a-e8aa-4568-882a-02ad8f9e19b0" providerId="ADAL" clId="{2798568F-B1F6-47B2-A404-0ED5144EAF91}" dt="2024-09-19T16:29:30.439" v="120" actId="20577"/>
+          <ac:spMkLst>
+            <pc:docMk/>
+            <pc:sldMk cId="0" sldId="1217"/>
+            <ac:spMk id="61444" creationId="{00000000-0000-0000-0000-000000000000}"/>
+          </ac:spMkLst>
+        </pc:spChg>
+      </pc:sldChg>
+      <pc:sldChg chg="addSp delSp modSp new mod">
+        <pc:chgData name="Lines, Todd" userId="afaf7c3a-e8aa-4568-882a-02ad8f9e19b0" providerId="ADAL" clId="{2798568F-B1F6-47B2-A404-0ED5144EAF91}" dt="2024-09-19T16:26:03.017" v="112" actId="1076"/>
+        <pc:sldMkLst>
+          <pc:docMk/>
+          <pc:sldMk cId="419790442" sldId="1440"/>
+        </pc:sldMkLst>
+        <pc:spChg chg="del">
+          <ac:chgData name="Lines, Todd" userId="afaf7c3a-e8aa-4568-882a-02ad8f9e19b0" providerId="ADAL" clId="{2798568F-B1F6-47B2-A404-0ED5144EAF91}" dt="2024-09-19T16:23:22.886" v="2" actId="478"/>
+          <ac:spMkLst>
+            <pc:docMk/>
+            <pc:sldMk cId="419790442" sldId="1440"/>
+            <ac:spMk id="2" creationId="{B2E53A56-51C5-D908-91ED-69689F7B80BE}"/>
+          </ac:spMkLst>
+        </pc:spChg>
+        <pc:spChg chg="del">
+          <ac:chgData name="Lines, Todd" userId="afaf7c3a-e8aa-4568-882a-02ad8f9e19b0" providerId="ADAL" clId="{2798568F-B1F6-47B2-A404-0ED5144EAF91}" dt="2024-09-19T16:23:20.777" v="1" actId="478"/>
+          <ac:spMkLst>
+            <pc:docMk/>
+            <pc:sldMk cId="419790442" sldId="1440"/>
+            <ac:spMk id="3" creationId="{A391633B-86FC-8288-8DA4-1F1255F9C83F}"/>
+          </ac:spMkLst>
+        </pc:spChg>
+        <pc:spChg chg="add mod">
+          <ac:chgData name="Lines, Todd" userId="afaf7c3a-e8aa-4568-882a-02ad8f9e19b0" providerId="ADAL" clId="{2798568F-B1F6-47B2-A404-0ED5144EAF91}" dt="2024-09-19T16:24:12.863" v="29" actId="1076"/>
+          <ac:spMkLst>
+            <pc:docMk/>
+            <pc:sldMk cId="419790442" sldId="1440"/>
+            <ac:spMk id="6" creationId="{2551F4A7-496E-BB66-C80B-DFA7E28CB5A5}"/>
+          </ac:spMkLst>
+        </pc:spChg>
+        <pc:spChg chg="add del mod">
+          <ac:chgData name="Lines, Todd" userId="afaf7c3a-e8aa-4568-882a-02ad8f9e19b0" providerId="ADAL" clId="{2798568F-B1F6-47B2-A404-0ED5144EAF91}" dt="2024-09-19T16:24:16.678" v="31" actId="478"/>
+          <ac:spMkLst>
+            <pc:docMk/>
+            <pc:sldMk cId="419790442" sldId="1440"/>
+            <ac:spMk id="7" creationId="{26C800E7-1C3B-C5B5-4D5A-AC048848BABC}"/>
+          </ac:spMkLst>
+        </pc:spChg>
+        <pc:spChg chg="add mod">
+          <ac:chgData name="Lines, Todd" userId="afaf7c3a-e8aa-4568-882a-02ad8f9e19b0" providerId="ADAL" clId="{2798568F-B1F6-47B2-A404-0ED5144EAF91}" dt="2024-09-19T16:24:27.418" v="49" actId="20577"/>
+          <ac:spMkLst>
+            <pc:docMk/>
+            <pc:sldMk cId="419790442" sldId="1440"/>
+            <ac:spMk id="8" creationId="{22291421-B93F-B79A-16B7-FA535695C962}"/>
+          </ac:spMkLst>
+        </pc:spChg>
+        <pc:spChg chg="add mod">
+          <ac:chgData name="Lines, Todd" userId="afaf7c3a-e8aa-4568-882a-02ad8f9e19b0" providerId="ADAL" clId="{2798568F-B1F6-47B2-A404-0ED5144EAF91}" dt="2024-09-19T16:25:43.262" v="108" actId="1076"/>
+          <ac:spMkLst>
+            <pc:docMk/>
+            <pc:sldMk cId="419790442" sldId="1440"/>
+            <ac:spMk id="9" creationId="{CE5583C7-4C2B-4F3B-7590-4258DFAD07DE}"/>
+          </ac:spMkLst>
+        </pc:spChg>
+        <pc:spChg chg="add mod">
+          <ac:chgData name="Lines, Todd" userId="afaf7c3a-e8aa-4568-882a-02ad8f9e19b0" providerId="ADAL" clId="{2798568F-B1F6-47B2-A404-0ED5144EAF91}" dt="2024-09-19T16:25:16.110" v="98" actId="1076"/>
+          <ac:spMkLst>
+            <pc:docMk/>
+            <pc:sldMk cId="419790442" sldId="1440"/>
+            <ac:spMk id="10" creationId="{BB1C3AB4-FC63-4975-5E14-275BF9F62E80}"/>
+          </ac:spMkLst>
+        </pc:spChg>
+        <pc:spChg chg="add mod">
+          <ac:chgData name="Lines, Todd" userId="afaf7c3a-e8aa-4568-882a-02ad8f9e19b0" providerId="ADAL" clId="{2798568F-B1F6-47B2-A404-0ED5144EAF91}" dt="2024-09-19T16:25:54.711" v="110" actId="2085"/>
+          <ac:spMkLst>
+            <pc:docMk/>
+            <pc:sldMk cId="419790442" sldId="1440"/>
+            <ac:spMk id="11" creationId="{71CE6340-D329-9291-C9DE-B41CFD997001}"/>
+          </ac:spMkLst>
+        </pc:spChg>
+        <pc:spChg chg="add mod">
+          <ac:chgData name="Lines, Todd" userId="afaf7c3a-e8aa-4568-882a-02ad8f9e19b0" providerId="ADAL" clId="{2798568F-B1F6-47B2-A404-0ED5144EAF91}" dt="2024-09-19T16:26:03.017" v="112" actId="1076"/>
+          <ac:spMkLst>
+            <pc:docMk/>
+            <pc:sldMk cId="419790442" sldId="1440"/>
+            <ac:spMk id="12" creationId="{45F42D0D-16BA-7C89-99F5-B53B75A9AFFA}"/>
+          </ac:spMkLst>
+        </pc:spChg>
+        <pc:picChg chg="add mod">
+          <ac:chgData name="Lines, Todd" userId="afaf7c3a-e8aa-4568-882a-02ad8f9e19b0" providerId="ADAL" clId="{2798568F-B1F6-47B2-A404-0ED5144EAF91}" dt="2024-09-19T16:23:32.184" v="6" actId="1076"/>
+          <ac:picMkLst>
+            <pc:docMk/>
+            <pc:sldMk cId="419790442" sldId="1440"/>
+            <ac:picMk id="5" creationId="{EA524902-DB37-F6B1-BE57-411B7205A136}"/>
+          </ac:picMkLst>
+        </pc:picChg>
+      </pc:sldChg>
+    </pc:docChg>
+  </pc:docChgLst>
 </pc:chgInfo>
 </file>
 
@@ -764,7 +820,7 @@
             <a:fld id="{6994D22E-2918-4A36-A02A-1FD2D5623025}" type="datetimeFigureOut">
               <a:rPr lang="en-US" smtClean="0"/>
               <a:pPr/>
-              <a:t>9/18/2023</a:t>
+              <a:t>9/19/2024</a:t>
             </a:fld>
             <a:endParaRPr lang="en-US"/>
           </a:p>
@@ -1874,7 +1930,7 @@
             <a:fld id="{3DD08A94-13AC-4482-8A21-A545224C0841}" type="datetimeFigureOut">
               <a:rPr lang="en-US" smtClean="0"/>
               <a:pPr/>
-              <a:t>9/18/2023</a:t>
+              <a:t>9/19/2024</a:t>
             </a:fld>
             <a:endParaRPr lang="en-US"/>
           </a:p>
@@ -2039,7 +2095,7 @@
             <a:fld id="{3DD08A94-13AC-4482-8A21-A545224C0841}" type="datetimeFigureOut">
               <a:rPr lang="en-US" smtClean="0"/>
               <a:pPr/>
-              <a:t>9/18/2023</a:t>
+              <a:t>9/19/2024</a:t>
             </a:fld>
             <a:endParaRPr lang="en-US"/>
           </a:p>
@@ -2214,7 +2270,7 @@
             <a:fld id="{3DD08A94-13AC-4482-8A21-A545224C0841}" type="datetimeFigureOut">
               <a:rPr lang="en-US" smtClean="0"/>
               <a:pPr/>
-              <a:t>9/18/2023</a:t>
+              <a:t>9/19/2024</a:t>
             </a:fld>
             <a:endParaRPr lang="en-US"/>
           </a:p>
@@ -2379,7 +2435,7 @@
             <a:fld id="{3DD08A94-13AC-4482-8A21-A545224C0841}" type="datetimeFigureOut">
               <a:rPr lang="en-US" smtClean="0"/>
               <a:pPr/>
-              <a:t>9/18/2023</a:t>
+              <a:t>9/19/2024</a:t>
             </a:fld>
             <a:endParaRPr lang="en-US"/>
           </a:p>
@@ -2621,7 +2677,7 @@
             <a:fld id="{3DD08A94-13AC-4482-8A21-A545224C0841}" type="datetimeFigureOut">
               <a:rPr lang="en-US" smtClean="0"/>
               <a:pPr/>
-              <a:t>9/18/2023</a:t>
+              <a:t>9/19/2024</a:t>
             </a:fld>
             <a:endParaRPr lang="en-US"/>
           </a:p>
@@ -2903,7 +2959,7 @@
             <a:fld id="{3DD08A94-13AC-4482-8A21-A545224C0841}" type="datetimeFigureOut">
               <a:rPr lang="en-US" smtClean="0"/>
               <a:pPr/>
-              <a:t>9/18/2023</a:t>
+              <a:t>9/19/2024</a:t>
             </a:fld>
             <a:endParaRPr lang="en-US"/>
           </a:p>
@@ -3319,7 +3375,7 @@
             <a:fld id="{3DD08A94-13AC-4482-8A21-A545224C0841}" type="datetimeFigureOut">
               <a:rPr lang="en-US" smtClean="0"/>
               <a:pPr/>
-              <a:t>9/18/2023</a:t>
+              <a:t>9/19/2024</a:t>
             </a:fld>
             <a:endParaRPr lang="en-US"/>
           </a:p>
@@ -3433,7 +3489,7 @@
             <a:fld id="{3DD08A94-13AC-4482-8A21-A545224C0841}" type="datetimeFigureOut">
               <a:rPr lang="en-US" smtClean="0"/>
               <a:pPr/>
-              <a:t>9/18/2023</a:t>
+              <a:t>9/19/2024</a:t>
             </a:fld>
             <a:endParaRPr lang="en-US"/>
           </a:p>
@@ -3525,7 +3581,7 @@
             <a:fld id="{3DD08A94-13AC-4482-8A21-A545224C0841}" type="datetimeFigureOut">
               <a:rPr lang="en-US" smtClean="0"/>
               <a:pPr/>
-              <a:t>9/18/2023</a:t>
+              <a:t>9/19/2024</a:t>
             </a:fld>
             <a:endParaRPr lang="en-US"/>
           </a:p>
@@ -3797,7 +3853,7 @@
             <a:fld id="{3DD08A94-13AC-4482-8A21-A545224C0841}" type="datetimeFigureOut">
               <a:rPr lang="en-US" smtClean="0"/>
               <a:pPr/>
-              <a:t>9/18/2023</a:t>
+              <a:t>9/19/2024</a:t>
             </a:fld>
             <a:endParaRPr lang="en-US"/>
           </a:p>
@@ -4046,7 +4102,7 @@
             <a:fld id="{3DD08A94-13AC-4482-8A21-A545224C0841}" type="datetimeFigureOut">
               <a:rPr lang="en-US" smtClean="0"/>
               <a:pPr/>
-              <a:t>9/18/2023</a:t>
+              <a:t>9/19/2024</a:t>
             </a:fld>
             <a:endParaRPr lang="en-US"/>
           </a:p>
@@ -4254,7 +4310,7 @@
             <a:fld id="{3DD08A94-13AC-4482-8A21-A545224C0841}" type="datetimeFigureOut">
               <a:rPr lang="en-US" smtClean="0"/>
               <a:pPr/>
-              <a:t>9/18/2023</a:t>
+              <a:t>9/19/2024</a:t>
             </a:fld>
             <a:endParaRPr lang="en-US"/>
           </a:p>
@@ -39215,262 +39271,302 @@
           <a:chExt cx="0" cy="0"/>
         </a:xfrm>
       </p:grpSpPr>
+      <p:pic>
+        <p:nvPicPr>
+          <p:cNvPr id="5" name="Picture 4">
+            <a:extLst>
+              <a:ext uri="{FF2B5EF4-FFF2-40B4-BE49-F238E27FC236}">
+                <a16:creationId xmlns:a16="http://schemas.microsoft.com/office/drawing/2014/main" id="{EA524902-DB37-F6B1-BE57-411B7205A136}"/>
+              </a:ext>
+            </a:extLst>
+          </p:cNvPr>
+          <p:cNvPicPr>
+            <a:picLocks noChangeAspect="1"/>
+          </p:cNvPicPr>
+          <p:nvPr/>
+        </p:nvPicPr>
+        <p:blipFill>
+          <a:blip r:embed="rId2"/>
+          <a:stretch>
+            <a:fillRect/>
+          </a:stretch>
+        </p:blipFill>
+        <p:spPr>
+          <a:xfrm>
+            <a:off x="1019521" y="619933"/>
+            <a:ext cx="7104958" cy="4698744"/>
+          </a:xfrm>
+          <a:prstGeom prst="rect">
+            <a:avLst/>
+          </a:prstGeom>
+        </p:spPr>
+      </p:pic>
       <p:sp>
         <p:nvSpPr>
-          <p:cNvPr id="61443" name="Rectangle 2"/>
-          <p:cNvSpPr>
-            <a:spLocks noGrp="1" noChangeArrowheads="1"/>
-          </p:cNvSpPr>
-          <p:nvPr>
-            <p:ph type="title"/>
-          </p:nvPr>
+          <p:cNvPr id="6" name="TextBox 5">
+            <a:extLst>
+              <a:ext uri="{FF2B5EF4-FFF2-40B4-BE49-F238E27FC236}">
+                <a16:creationId xmlns:a16="http://schemas.microsoft.com/office/drawing/2014/main" id="{2551F4A7-496E-BB66-C80B-DFA7E28CB5A5}"/>
+              </a:ext>
+            </a:extLst>
+          </p:cNvPr>
+          <p:cNvSpPr txBox="1"/>
+          <p:nvPr/>
         </p:nvSpPr>
-        <p:spPr/>
+        <p:spPr>
+          <a:xfrm rot="16200000">
+            <a:off x="-261952" y="2585884"/>
+            <a:ext cx="2193614" cy="369332"/>
+          </a:xfrm>
+          <a:prstGeom prst="rect">
+            <a:avLst/>
+          </a:prstGeom>
+          <a:noFill/>
+        </p:spPr>
         <p:txBody>
-          <a:bodyPr/>
+          <a:bodyPr wrap="none" rtlCol="0">
+            <a:spAutoFit/>
+          </a:bodyPr>
           <a:lstStyle/>
           <a:p>
             <a:r>
               <a:rPr lang="en-US" dirty="0"/>
-              <a:t>Question 223.4.3</a:t>
+              <a:t>Speed of sound (m/s)</a:t>
             </a:r>
           </a:p>
         </p:txBody>
       </p:sp>
       <p:sp>
         <p:nvSpPr>
-          <p:cNvPr id="61444" name="Rectangle 3"/>
-          <p:cNvSpPr>
-            <a:spLocks noGrp="1" noChangeArrowheads="1"/>
-          </p:cNvSpPr>
-          <p:nvPr>
-            <p:ph idx="1"/>
-          </p:nvPr>
+          <p:cNvPr id="8" name="TextBox 7">
+            <a:extLst>
+              <a:ext uri="{FF2B5EF4-FFF2-40B4-BE49-F238E27FC236}">
+                <a16:creationId xmlns:a16="http://schemas.microsoft.com/office/drawing/2014/main" id="{22291421-B93F-B79A-16B7-FA535695C962}"/>
+              </a:ext>
+            </a:extLst>
+          </p:cNvPr>
+          <p:cNvSpPr txBox="1"/>
+          <p:nvPr/>
         </p:nvSpPr>
-        <p:spPr/>
+        <p:spPr>
+          <a:xfrm>
+            <a:off x="3765755" y="5594555"/>
+            <a:ext cx="1823000" cy="369332"/>
+          </a:xfrm>
+          <a:prstGeom prst="rect">
+            <a:avLst/>
+          </a:prstGeom>
+          <a:noFill/>
+        </p:spPr>
         <p:txBody>
-          <a:bodyPr/>
+          <a:bodyPr wrap="none" rtlCol="0">
+            <a:spAutoFit/>
+          </a:bodyPr>
           <a:lstStyle/>
           <a:p>
-            <a:pPr marL="533400" indent="-533400" eaLnBrk="1" hangingPunct="1">
-              <a:lnSpc>
-                <a:spcPct val="125000"/>
-              </a:lnSpc>
-              <a:spcBef>
-                <a:spcPct val="50000"/>
-              </a:spcBef>
-              <a:buFontTx/>
-              <a:buNone/>
-            </a:pPr>
             <a:r>
-              <a:rPr lang="en-US" sz="2800" b="1" dirty="0"/>
-              <a:t>When a sound wave passes from air into water, what properties of the wave will change?</a:t>
-            </a:r>
-          </a:p>
-          <a:p>
-            <a:pPr marL="533400" indent="-533400" eaLnBrk="1" hangingPunct="1">
-              <a:lnSpc>
-                <a:spcPct val="130000"/>
-              </a:lnSpc>
-              <a:buFontTx/>
-              <a:buAutoNum type="alphaLcParenR"/>
-            </a:pPr>
-            <a:r>
-              <a:rPr lang="en-US" sz="2800" b="1" dirty="0">
-                <a:solidFill>
-                  <a:schemeClr val="tx2"/>
-                </a:solidFill>
-              </a:rPr>
-              <a:t>the frequency </a:t>
+              <a:rPr lang="en-US" dirty="0"/>
+              <a:t>Temperature (</a:t>
             </a:r>
             <a:r>
-              <a:rPr lang="en-US" sz="2800" i="1" dirty="0">
-                <a:solidFill>
-                  <a:schemeClr val="tx2"/>
-                </a:solidFill>
-                <a:latin typeface="Arial Black" pitchFamily="34" charset="0"/>
+              <a:rPr lang="en-US" dirty="0">
+                <a:sym typeface="Symbol" panose="05050102010706020507" pitchFamily="18" charset="2"/>
               </a:rPr>
-              <a:t>f</a:t>
-            </a:r>
-          </a:p>
-          <a:p>
-            <a:pPr marL="533400" indent="-533400" eaLnBrk="1" hangingPunct="1">
-              <a:lnSpc>
-                <a:spcPct val="130000"/>
-              </a:lnSpc>
-              <a:buFontTx/>
-              <a:buAutoNum type="alphaLcParenR"/>
-            </a:pPr>
-            <a:r>
-              <a:rPr lang="en-US" sz="2800" b="1" dirty="0">
-                <a:solidFill>
-                  <a:schemeClr val="tx2"/>
-                </a:solidFill>
-              </a:rPr>
-              <a:t>the wavelength </a:t>
+              <a:t></a:t>
             </a:r>
             <a:r>
-              <a:rPr lang="en-US" sz="2800" b="1" dirty="0">
-                <a:solidFill>
-                  <a:schemeClr val="tx2"/>
-                </a:solidFill>
-                <a:latin typeface="Symbol" pitchFamily="18" charset="2"/>
-              </a:rPr>
-              <a:t>l</a:t>
+              <a:rPr lang="en-US" dirty="0"/>
+              <a:t>C)</a:t>
             </a:r>
-            <a:endParaRPr lang="en-US" sz="2800" b="1" dirty="0">
-              <a:solidFill>
-                <a:schemeClr val="tx2"/>
-              </a:solidFill>
-            </a:endParaRPr>
-          </a:p>
-          <a:p>
-            <a:pPr marL="533400" indent="-533400" eaLnBrk="1" hangingPunct="1">
-              <a:lnSpc>
-                <a:spcPct val="130000"/>
-              </a:lnSpc>
-              <a:buFontTx/>
-              <a:buAutoNum type="alphaLcParenR"/>
-            </a:pPr>
-            <a:r>
-              <a:rPr lang="en-US" sz="2800" b="1" dirty="0">
-                <a:solidFill>
-                  <a:schemeClr val="tx2"/>
-                </a:solidFill>
-              </a:rPr>
-              <a:t>the speed of the wave</a:t>
-            </a:r>
-          </a:p>
-          <a:p>
-            <a:pPr marL="533400" indent="-533400" eaLnBrk="1" hangingPunct="1">
-              <a:lnSpc>
-                <a:spcPct val="130000"/>
-              </a:lnSpc>
-              <a:buFontTx/>
-              <a:buAutoNum type="alphaLcParenR"/>
-            </a:pPr>
-            <a:r>
-              <a:rPr lang="en-US" sz="2800" b="1" dirty="0">
-                <a:solidFill>
-                  <a:schemeClr val="tx2"/>
-                </a:solidFill>
-              </a:rPr>
-              <a:t>both </a:t>
-            </a:r>
-            <a:r>
-              <a:rPr lang="en-US" sz="2800" b="1" i="1" dirty="0">
-                <a:solidFill>
-                  <a:schemeClr val="tx2"/>
-                </a:solidFill>
-              </a:rPr>
-              <a:t>f</a:t>
-            </a:r>
-            <a:r>
-              <a:rPr lang="en-US" sz="2800" b="1" dirty="0">
-                <a:solidFill>
-                  <a:schemeClr val="tx2"/>
-                </a:solidFill>
-              </a:rPr>
-              <a:t> and </a:t>
-            </a:r>
-            <a:r>
-              <a:rPr lang="en-US" sz="2800" b="1" dirty="0">
-                <a:solidFill>
-                  <a:schemeClr val="tx2"/>
-                </a:solidFill>
-                <a:latin typeface="Symbol" pitchFamily="18" charset="2"/>
-              </a:rPr>
-              <a:t>l</a:t>
-            </a:r>
-          </a:p>
-          <a:p>
-            <a:pPr marL="533400" indent="-533400" eaLnBrk="1" hangingPunct="1">
-              <a:lnSpc>
-                <a:spcPct val="130000"/>
-              </a:lnSpc>
-              <a:buFontTx/>
-              <a:buAutoNum type="alphaLcParenR"/>
-            </a:pPr>
-            <a:r>
-              <a:rPr lang="en-US" sz="2800" b="1" dirty="0">
-                <a:solidFill>
-                  <a:schemeClr val="tx2"/>
-                </a:solidFill>
-              </a:rPr>
-              <a:t>both </a:t>
-            </a:r>
-            <a:r>
-              <a:rPr lang="en-US" sz="2800" b="1" i="1" dirty="0" err="1">
-                <a:solidFill>
-                  <a:schemeClr val="tx2"/>
-                </a:solidFill>
-              </a:rPr>
-              <a:t>v</a:t>
-            </a:r>
-            <a:r>
-              <a:rPr lang="en-US" sz="2800" b="1" baseline="-25000" dirty="0" err="1">
-                <a:solidFill>
-                  <a:schemeClr val="tx2"/>
-                </a:solidFill>
-              </a:rPr>
-              <a:t>wave</a:t>
-            </a:r>
-            <a:r>
-              <a:rPr lang="en-US" sz="2800" b="1" dirty="0">
-                <a:solidFill>
-                  <a:schemeClr val="tx2"/>
-                </a:solidFill>
-              </a:rPr>
-              <a:t> and </a:t>
-            </a:r>
-            <a:r>
-              <a:rPr lang="en-US" sz="2800" b="1" dirty="0">
-                <a:solidFill>
-                  <a:schemeClr val="tx2"/>
-                </a:solidFill>
-                <a:latin typeface="Symbol" pitchFamily="18" charset="2"/>
-              </a:rPr>
-              <a:t>l</a:t>
-            </a:r>
-            <a:endParaRPr lang="en-US" sz="2800" b="1" dirty="0">
-              <a:solidFill>
-                <a:schemeClr val="tx2"/>
-              </a:solidFill>
-            </a:endParaRPr>
-          </a:p>
-          <a:p>
-            <a:pPr marL="533400" indent="-533400" eaLnBrk="1" hangingPunct="1"/>
-            <a:endParaRPr lang="en-US" sz="2800" dirty="0"/>
           </a:p>
         </p:txBody>
       </p:sp>
       <p:sp>
         <p:nvSpPr>
-          <p:cNvPr id="61442" name="Slide Number Placeholder 5"/>
-          <p:cNvSpPr>
-            <a:spLocks noGrp="1"/>
-          </p:cNvSpPr>
-          <p:nvPr>
-            <p:ph type="sldNum" sz="quarter" idx="12"/>
-          </p:nvPr>
+          <p:cNvPr id="9" name="TextBox 8">
+            <a:extLst>
+              <a:ext uri="{FF2B5EF4-FFF2-40B4-BE49-F238E27FC236}">
+                <a16:creationId xmlns:a16="http://schemas.microsoft.com/office/drawing/2014/main" id="{CE5583C7-4C2B-4F3B-7590-4258DFAD07DE}"/>
+              </a:ext>
+            </a:extLst>
+          </p:cNvPr>
+          <p:cNvSpPr txBox="1"/>
+          <p:nvPr/>
         </p:nvSpPr>
         <p:spPr>
+          <a:xfrm>
+            <a:off x="1268966" y="5868735"/>
+            <a:ext cx="1647374" cy="369332"/>
+          </a:xfrm>
+          <a:prstGeom prst="rect">
+            <a:avLst/>
+          </a:prstGeom>
           <a:noFill/>
         </p:spPr>
         <p:txBody>
-          <a:bodyPr/>
+          <a:bodyPr wrap="none" rtlCol="0">
+            <a:spAutoFit/>
+          </a:bodyPr>
           <a:lstStyle/>
           <a:p>
-            <a:fld id="{7E643066-6A67-4F35-A09C-605218B5A8FD}" type="slidenum">
-              <a:rPr lang="en-US" smtClean="0"/>
-              <a:pPr/>
-              <a:t>19</a:t>
-            </a:fld>
+            <a:r>
+              <a:rPr lang="en-US" dirty="0"/>
+              <a:t>Rexburg Winter</a:t>
+            </a:r>
+          </a:p>
+        </p:txBody>
+      </p:sp>
+      <p:sp>
+        <p:nvSpPr>
+          <p:cNvPr id="10" name="TextBox 9">
+            <a:extLst>
+              <a:ext uri="{FF2B5EF4-FFF2-40B4-BE49-F238E27FC236}">
+                <a16:creationId xmlns:a16="http://schemas.microsoft.com/office/drawing/2014/main" id="{BB1C3AB4-FC63-4975-5E14-275BF9F62E80}"/>
+              </a:ext>
+            </a:extLst>
+          </p:cNvPr>
+          <p:cNvSpPr txBox="1"/>
+          <p:nvPr/>
+        </p:nvSpPr>
+        <p:spPr>
+          <a:xfrm>
+            <a:off x="7287586" y="5777074"/>
+            <a:ext cx="942630" cy="369332"/>
+          </a:xfrm>
+          <a:prstGeom prst="rect">
+            <a:avLst/>
+          </a:prstGeom>
+          <a:noFill/>
+        </p:spPr>
+        <p:txBody>
+          <a:bodyPr wrap="none" rtlCol="0">
+            <a:spAutoFit/>
+          </a:bodyPr>
+          <a:lstStyle/>
+          <a:p>
+            <a:r>
+              <a:rPr lang="en-US" dirty="0"/>
+              <a:t>Amazon</a:t>
+            </a:r>
+          </a:p>
+        </p:txBody>
+      </p:sp>
+      <p:sp>
+        <p:nvSpPr>
+          <p:cNvPr id="11" name="Arrow: Down 10">
+            <a:extLst>
+              <a:ext uri="{FF2B5EF4-FFF2-40B4-BE49-F238E27FC236}">
+                <a16:creationId xmlns:a16="http://schemas.microsoft.com/office/drawing/2014/main" id="{71CE6340-D329-9291-C9DE-B41CFD997001}"/>
+              </a:ext>
+            </a:extLst>
+          </p:cNvPr>
+          <p:cNvSpPr/>
+          <p:nvPr/>
+        </p:nvSpPr>
+        <p:spPr>
+          <a:xfrm flipV="1">
+            <a:off x="1810944" y="5226467"/>
+            <a:ext cx="255980" cy="550607"/>
+          </a:xfrm>
+          <a:prstGeom prst="downArrow">
+            <a:avLst>
+              <a:gd name="adj1" fmla="val 50000"/>
+              <a:gd name="adj2" fmla="val 78292"/>
+            </a:avLst>
+          </a:prstGeom>
+          <a:solidFill>
+            <a:schemeClr val="accent2"/>
+          </a:solidFill>
+          <a:ln>
+            <a:noFill/>
+          </a:ln>
+        </p:spPr>
+        <p:style>
+          <a:lnRef idx="2">
+            <a:schemeClr val="accent1">
+              <a:shade val="15000"/>
+            </a:schemeClr>
+          </a:lnRef>
+          <a:fillRef idx="1">
+            <a:schemeClr val="accent1"/>
+          </a:fillRef>
+          <a:effectRef idx="0">
+            <a:schemeClr val="accent1"/>
+          </a:effectRef>
+          <a:fontRef idx="minor">
+            <a:schemeClr val="lt1"/>
+          </a:fontRef>
+        </p:style>
+        <p:txBody>
+          <a:bodyPr rtlCol="0" anchor="ctr"/>
+          <a:lstStyle/>
+          <a:p>
+            <a:pPr algn="ctr"/>
+            <a:endParaRPr lang="en-US"/>
+          </a:p>
+        </p:txBody>
+      </p:sp>
+      <p:sp>
+        <p:nvSpPr>
+          <p:cNvPr id="12" name="Arrow: Down 11">
+            <a:extLst>
+              <a:ext uri="{FF2B5EF4-FFF2-40B4-BE49-F238E27FC236}">
+                <a16:creationId xmlns:a16="http://schemas.microsoft.com/office/drawing/2014/main" id="{45F42D0D-16BA-7C89-99F5-B53B75A9AFFA}"/>
+              </a:ext>
+            </a:extLst>
+          </p:cNvPr>
+          <p:cNvSpPr/>
+          <p:nvPr/>
+        </p:nvSpPr>
+        <p:spPr>
+          <a:xfrm flipV="1">
+            <a:off x="7630911" y="5226466"/>
+            <a:ext cx="255980" cy="550607"/>
+          </a:xfrm>
+          <a:prstGeom prst="downArrow">
+            <a:avLst>
+              <a:gd name="adj1" fmla="val 50000"/>
+              <a:gd name="adj2" fmla="val 78292"/>
+            </a:avLst>
+          </a:prstGeom>
+          <a:solidFill>
+            <a:schemeClr val="accent2"/>
+          </a:solidFill>
+          <a:ln>
+            <a:noFill/>
+          </a:ln>
+        </p:spPr>
+        <p:style>
+          <a:lnRef idx="2">
+            <a:schemeClr val="accent1">
+              <a:shade val="15000"/>
+            </a:schemeClr>
+          </a:lnRef>
+          <a:fillRef idx="1">
+            <a:schemeClr val="accent1"/>
+          </a:fillRef>
+          <a:effectRef idx="0">
+            <a:schemeClr val="accent1"/>
+          </a:effectRef>
+          <a:fontRef idx="minor">
+            <a:schemeClr val="lt1"/>
+          </a:fontRef>
+        </p:style>
+        <p:txBody>
+          <a:bodyPr rtlCol="0" anchor="ctr"/>
+          <a:lstStyle/>
+          <a:p>
+            <a:pPr algn="ctr"/>
             <a:endParaRPr lang="en-US"/>
           </a:p>
         </p:txBody>
       </p:sp>
     </p:spTree>
+    <p:extLst>
+      <p:ext uri="{BB962C8B-B14F-4D97-AF65-F5344CB8AC3E}">
+        <p14:creationId xmlns:p14="http://schemas.microsoft.com/office/powerpoint/2010/main" val="419790442"/>
+      </p:ext>
+    </p:extLst>
   </p:cSld>
   <p:clrMapOvr>
     <a:masterClrMapping/>
@@ -40327,6 +40423,267 @@
       </p:grpSpPr>
       <p:sp>
         <p:nvSpPr>
+          <p:cNvPr id="61443" name="Rectangle 2"/>
+          <p:cNvSpPr>
+            <a:spLocks noGrp="1" noChangeArrowheads="1"/>
+          </p:cNvSpPr>
+          <p:nvPr>
+            <p:ph type="title"/>
+          </p:nvPr>
+        </p:nvSpPr>
+        <p:spPr/>
+        <p:txBody>
+          <a:bodyPr/>
+          <a:lstStyle/>
+          <a:p>
+            <a:r>
+              <a:rPr lang="en-US" dirty="0"/>
+              <a:t>Question 223.4.3</a:t>
+            </a:r>
+          </a:p>
+        </p:txBody>
+      </p:sp>
+      <p:sp>
+        <p:nvSpPr>
+          <p:cNvPr id="61444" name="Rectangle 3"/>
+          <p:cNvSpPr>
+            <a:spLocks noGrp="1" noChangeArrowheads="1"/>
+          </p:cNvSpPr>
+          <p:nvPr>
+            <p:ph idx="1"/>
+          </p:nvPr>
+        </p:nvSpPr>
+        <p:spPr/>
+        <p:txBody>
+          <a:bodyPr/>
+          <a:lstStyle/>
+          <a:p>
+            <a:pPr marL="533400" indent="-533400" eaLnBrk="1" hangingPunct="1">
+              <a:lnSpc>
+                <a:spcPct val="125000"/>
+              </a:lnSpc>
+              <a:spcBef>
+                <a:spcPct val="50000"/>
+              </a:spcBef>
+              <a:buFontTx/>
+              <a:buNone/>
+            </a:pPr>
+            <a:r>
+              <a:rPr lang="en-US" sz="2800" dirty="0"/>
+              <a:t>When a sound wave passes from air into water, what properties of the wave will change?</a:t>
+            </a:r>
+          </a:p>
+          <a:p>
+            <a:pPr marL="533400" indent="-533400" eaLnBrk="1" hangingPunct="1">
+              <a:lnSpc>
+                <a:spcPct val="130000"/>
+              </a:lnSpc>
+              <a:buFontTx/>
+              <a:buAutoNum type="alphaLcParenR"/>
+            </a:pPr>
+            <a:r>
+              <a:rPr lang="en-US" sz="2800" dirty="0">
+                <a:solidFill>
+                  <a:schemeClr val="tx2"/>
+                </a:solidFill>
+              </a:rPr>
+              <a:t>the frequency f </a:t>
+            </a:r>
+            <a:endParaRPr lang="en-US" sz="2800" i="1" dirty="0">
+              <a:solidFill>
+                <a:schemeClr val="tx2"/>
+              </a:solidFill>
+              <a:latin typeface="Arial Black" pitchFamily="34" charset="0"/>
+            </a:endParaRPr>
+          </a:p>
+          <a:p>
+            <a:pPr marL="533400" indent="-533400" eaLnBrk="1" hangingPunct="1">
+              <a:lnSpc>
+                <a:spcPct val="130000"/>
+              </a:lnSpc>
+              <a:buFontTx/>
+              <a:buAutoNum type="alphaLcParenR"/>
+            </a:pPr>
+            <a:r>
+              <a:rPr lang="en-US" sz="2800" dirty="0">
+                <a:solidFill>
+                  <a:schemeClr val="tx2"/>
+                </a:solidFill>
+              </a:rPr>
+              <a:t>the wavelength </a:t>
+            </a:r>
+            <a:r>
+              <a:rPr lang="en-US" sz="2800" dirty="0">
+                <a:solidFill>
+                  <a:schemeClr val="tx2"/>
+                </a:solidFill>
+                <a:latin typeface="Symbol" pitchFamily="18" charset="2"/>
+              </a:rPr>
+              <a:t>l</a:t>
+            </a:r>
+            <a:endParaRPr lang="en-US" sz="2800" dirty="0">
+              <a:solidFill>
+                <a:schemeClr val="tx2"/>
+              </a:solidFill>
+            </a:endParaRPr>
+          </a:p>
+          <a:p>
+            <a:pPr marL="533400" indent="-533400" eaLnBrk="1" hangingPunct="1">
+              <a:lnSpc>
+                <a:spcPct val="130000"/>
+              </a:lnSpc>
+              <a:buFontTx/>
+              <a:buAutoNum type="alphaLcParenR"/>
+            </a:pPr>
+            <a:r>
+              <a:rPr lang="en-US" sz="2800" dirty="0">
+                <a:solidFill>
+                  <a:schemeClr val="tx2"/>
+                </a:solidFill>
+              </a:rPr>
+              <a:t>the speed of the wave</a:t>
+            </a:r>
+          </a:p>
+          <a:p>
+            <a:pPr marL="533400" indent="-533400" eaLnBrk="1" hangingPunct="1">
+              <a:lnSpc>
+                <a:spcPct val="130000"/>
+              </a:lnSpc>
+              <a:buFontTx/>
+              <a:buAutoNum type="alphaLcParenR"/>
+            </a:pPr>
+            <a:r>
+              <a:rPr lang="en-US" sz="2800" dirty="0">
+                <a:solidFill>
+                  <a:schemeClr val="tx2"/>
+                </a:solidFill>
+              </a:rPr>
+              <a:t>both f and </a:t>
+            </a:r>
+            <a:r>
+              <a:rPr lang="en-US" sz="2800" dirty="0">
+                <a:solidFill>
+                  <a:schemeClr val="tx2"/>
+                </a:solidFill>
+                <a:latin typeface="Symbol" pitchFamily="18" charset="2"/>
+              </a:rPr>
+              <a:t>l</a:t>
+            </a:r>
+          </a:p>
+          <a:p>
+            <a:pPr marL="533400" indent="-533400" eaLnBrk="1" hangingPunct="1">
+              <a:lnSpc>
+                <a:spcPct val="130000"/>
+              </a:lnSpc>
+              <a:buFontTx/>
+              <a:buAutoNum type="alphaLcParenR"/>
+            </a:pPr>
+            <a:r>
+              <a:rPr lang="en-US" sz="2800" dirty="0">
+                <a:solidFill>
+                  <a:schemeClr val="tx2"/>
+                </a:solidFill>
+              </a:rPr>
+              <a:t>both </a:t>
+            </a:r>
+            <a:r>
+              <a:rPr lang="en-US" sz="2800" i="1" dirty="0" err="1">
+                <a:solidFill>
+                  <a:schemeClr val="tx2"/>
+                </a:solidFill>
+              </a:rPr>
+              <a:t>v</a:t>
+            </a:r>
+            <a:r>
+              <a:rPr lang="en-US" sz="2800" baseline="-25000" dirty="0" err="1">
+                <a:solidFill>
+                  <a:schemeClr val="tx2"/>
+                </a:solidFill>
+              </a:rPr>
+              <a:t>wave</a:t>
+            </a:r>
+            <a:r>
+              <a:rPr lang="en-US" sz="2800" dirty="0">
+                <a:solidFill>
+                  <a:schemeClr val="tx2"/>
+                </a:solidFill>
+              </a:rPr>
+              <a:t> and </a:t>
+            </a:r>
+            <a:r>
+              <a:rPr lang="en-US" sz="2800" dirty="0">
+                <a:solidFill>
+                  <a:schemeClr val="tx2"/>
+                </a:solidFill>
+                <a:latin typeface="Symbol" pitchFamily="18" charset="2"/>
+              </a:rPr>
+              <a:t>l</a:t>
+            </a:r>
+            <a:endParaRPr lang="en-US" sz="2800" dirty="0">
+              <a:solidFill>
+                <a:schemeClr val="tx2"/>
+              </a:solidFill>
+            </a:endParaRPr>
+          </a:p>
+          <a:p>
+            <a:pPr marL="533400" indent="-533400" eaLnBrk="1" hangingPunct="1"/>
+            <a:endParaRPr lang="en-US" sz="2800" dirty="0"/>
+          </a:p>
+        </p:txBody>
+      </p:sp>
+      <p:sp>
+        <p:nvSpPr>
+          <p:cNvPr id="61442" name="Slide Number Placeholder 5"/>
+          <p:cNvSpPr>
+            <a:spLocks noGrp="1"/>
+          </p:cNvSpPr>
+          <p:nvPr>
+            <p:ph type="sldNum" sz="quarter" idx="12"/>
+          </p:nvPr>
+        </p:nvSpPr>
+        <p:spPr>
+          <a:noFill/>
+        </p:spPr>
+        <p:txBody>
+          <a:bodyPr/>
+          <a:lstStyle/>
+          <a:p>
+            <a:fld id="{7E643066-6A67-4F35-A09C-605218B5A8FD}" type="slidenum">
+              <a:rPr lang="en-US" smtClean="0"/>
+              <a:pPr/>
+              <a:t>20</a:t>
+            </a:fld>
+            <a:endParaRPr lang="en-US"/>
+          </a:p>
+        </p:txBody>
+      </p:sp>
+    </p:spTree>
+  </p:cSld>
+  <p:clrMapOvr>
+    <a:masterClrMapping/>
+  </p:clrMapOvr>
+</p:sld>
+</file>
+
+<file path=ppt/slides/slide21.xml><?xml version="1.0" encoding="utf-8"?>
+<p:sld xmlns:a="http://schemas.openxmlformats.org/drawingml/2006/main" xmlns:r="http://schemas.openxmlformats.org/officeDocument/2006/relationships" xmlns:p="http://schemas.openxmlformats.org/presentationml/2006/main">
+  <p:cSld>
+    <p:spTree>
+      <p:nvGrpSpPr>
+        <p:cNvPr id="1" name=""/>
+        <p:cNvGrpSpPr/>
+        <p:nvPr/>
+      </p:nvGrpSpPr>
+      <p:grpSpPr>
+        <a:xfrm>
+          <a:off x="0" y="0"/>
+          <a:ext cx="0" cy="0"/>
+          <a:chOff x="0" y="0"/>
+          <a:chExt cx="0" cy="0"/>
+        </a:xfrm>
+      </p:grpSpPr>
+      <p:sp>
+        <p:nvSpPr>
           <p:cNvPr id="52227" name="Rectangle 2"/>
           <p:cNvSpPr>
             <a:spLocks noGrp="1" noChangeArrowheads="1"/>
@@ -40433,7 +40790,7 @@
             <a:fld id="{6A354CA6-2371-4C3D-9BCD-3813C9281DFB}" type="slidenum">
               <a:rPr lang="en-US" smtClean="0"/>
               <a:pPr/>
-              <a:t>20</a:t>
+              <a:t>21</a:t>
             </a:fld>
             <a:endParaRPr lang="en-US"/>
           </a:p>
@@ -40447,7 +40804,7 @@
 </p:sld>
 </file>
 
-<file path=ppt/slides/slide21.xml><?xml version="1.0" encoding="utf-8"?>
+<file path=ppt/slides/slide22.xml><?xml version="1.0" encoding="utf-8"?>
 <p:sld xmlns:a="http://schemas.openxmlformats.org/drawingml/2006/main" xmlns:r="http://schemas.openxmlformats.org/officeDocument/2006/relationships" xmlns:p="http://schemas.openxmlformats.org/presentationml/2006/main">
   <p:cSld>
     <p:spTree>
@@ -40543,7 +40900,7 @@
 </p:sld>
 </file>
 
-<file path=ppt/slides/slide22.xml><?xml version="1.0" encoding="utf-8"?>
+<file path=ppt/slides/slide23.xml><?xml version="1.0" encoding="utf-8"?>
 <p:sld xmlns:a="http://schemas.openxmlformats.org/drawingml/2006/main" xmlns:r="http://schemas.openxmlformats.org/officeDocument/2006/relationships" xmlns:p="http://schemas.openxmlformats.org/presentationml/2006/main">
   <p:cSld>
     <p:spTree>
@@ -40695,7 +41052,7 @@
               <a:pPr>
                 <a:defRPr/>
               </a:pPr>
-              <a:t>22</a:t>
+              <a:t>23</a:t>
             </a:fld>
             <a:endParaRPr lang="en-US"/>
           </a:p>
@@ -40714,7 +41071,7 @@
 </p:sld>
 </file>
 
-<file path=ppt/slides/slide23.xml><?xml version="1.0" encoding="utf-8"?>
+<file path=ppt/slides/slide24.xml><?xml version="1.0" encoding="utf-8"?>
 <p:sld xmlns:a="http://schemas.openxmlformats.org/drawingml/2006/main" xmlns:r="http://schemas.openxmlformats.org/officeDocument/2006/relationships" xmlns:p="http://schemas.openxmlformats.org/presentationml/2006/main">
   <p:cSld>
     <p:spTree>
@@ -40835,7 +41192,7 @@
               <a:pPr>
                 <a:defRPr/>
               </a:pPr>
-              <a:t>23</a:t>
+              <a:t>24</a:t>
             </a:fld>
             <a:endParaRPr lang="en-US"/>
           </a:p>
@@ -41095,7 +41452,7 @@
 </p:sld>
 </file>
 
-<file path=ppt/slides/slide24.xml><?xml version="1.0" encoding="utf-8"?>
+<file path=ppt/slides/slide25.xml><?xml version="1.0" encoding="utf-8"?>
 <p:sld xmlns:a="http://schemas.openxmlformats.org/drawingml/2006/main" xmlns:r="http://schemas.openxmlformats.org/officeDocument/2006/relationships" xmlns:p="http://schemas.openxmlformats.org/presentationml/2006/main">
   <p:cSld>
     <p:spTree>
@@ -41200,7 +41557,7 @@
               <a:pPr>
                 <a:defRPr/>
               </a:pPr>
-              <a:t>24</a:t>
+              <a:t>25</a:t>
             </a:fld>
             <a:endParaRPr lang="en-US"/>
           </a:p>
@@ -41219,7 +41576,7 @@
 </p:sld>
 </file>
 
-<file path=ppt/slides/slide25.xml><?xml version="1.0" encoding="utf-8"?>
+<file path=ppt/slides/slide26.xml><?xml version="1.0" encoding="utf-8"?>
 <p:sld xmlns:a="http://schemas.openxmlformats.org/drawingml/2006/main" xmlns:r="http://schemas.openxmlformats.org/officeDocument/2006/relationships" xmlns:p="http://schemas.openxmlformats.org/presentationml/2006/main">
   <p:cSld>
     <p:spTree>
@@ -41349,7 +41706,7 @@
             <a:fld id="{4AD62F2E-7083-45D0-8919-2DFD6873DB31}" type="slidenum">
               <a:rPr lang="en-US" smtClean="0"/>
               <a:pPr/>
-              <a:t>25</a:t>
+              <a:t>26</a:t>
             </a:fld>
             <a:endParaRPr lang="en-US"/>
           </a:p>
@@ -41368,7 +41725,7 @@
 </p:sld>
 </file>
 
-<file path=ppt/slides/slide26.xml><?xml version="1.0" encoding="utf-8"?>
+<file path=ppt/slides/slide27.xml><?xml version="1.0" encoding="utf-8"?>
 <p:sld xmlns:a="http://schemas.openxmlformats.org/drawingml/2006/main" xmlns:r="http://schemas.openxmlformats.org/officeDocument/2006/relationships" xmlns:p="http://schemas.openxmlformats.org/presentationml/2006/main">
   <p:cSld>
     <p:spTree>
@@ -41477,7 +41834,7 @@
 </p:sld>
 </file>
 
-<file path=ppt/slides/slide27.xml><?xml version="1.0" encoding="utf-8"?>
+<file path=ppt/slides/slide28.xml><?xml version="1.0" encoding="utf-8"?>
 <p:sld xmlns:a="http://schemas.openxmlformats.org/drawingml/2006/main" xmlns:r="http://schemas.openxmlformats.org/officeDocument/2006/relationships" xmlns:p="http://schemas.openxmlformats.org/presentationml/2006/main">
   <p:cSld>
     <p:spTree>
@@ -41589,163 +41946,6 @@
 </p:sld>
 </file>
 
-<file path=ppt/slides/slide28.xml><?xml version="1.0" encoding="utf-8"?>
-<p:sld xmlns:a="http://schemas.openxmlformats.org/drawingml/2006/main" xmlns:r="http://schemas.openxmlformats.org/officeDocument/2006/relationships" xmlns:p="http://schemas.openxmlformats.org/presentationml/2006/main">
-  <p:cSld>
-    <p:spTree>
-      <p:nvGrpSpPr>
-        <p:cNvPr id="1" name=""/>
-        <p:cNvGrpSpPr/>
-        <p:nvPr/>
-      </p:nvGrpSpPr>
-      <p:grpSpPr>
-        <a:xfrm>
-          <a:off x="0" y="0"/>
-          <a:ext cx="0" cy="0"/>
-          <a:chOff x="0" y="0"/>
-          <a:chExt cx="0" cy="0"/>
-        </a:xfrm>
-      </p:grpSpPr>
-      <p:sp>
-        <p:nvSpPr>
-          <p:cNvPr id="2" name="Title 1"/>
-          <p:cNvSpPr>
-            <a:spLocks noGrp="1"/>
-          </p:cNvSpPr>
-          <p:nvPr>
-            <p:ph type="title"/>
-          </p:nvPr>
-        </p:nvSpPr>
-        <p:spPr/>
-        <p:txBody>
-          <a:bodyPr/>
-          <a:lstStyle/>
-          <a:p>
-            <a:r>
-              <a:rPr lang="en-US" dirty="0"/>
-              <a:t>Question  223.4.5     123.22.1</a:t>
-            </a:r>
-          </a:p>
-        </p:txBody>
-      </p:sp>
-      <p:sp>
-        <p:nvSpPr>
-          <p:cNvPr id="3" name="Content Placeholder 2"/>
-          <p:cNvSpPr>
-            <a:spLocks noGrp="1"/>
-          </p:cNvSpPr>
-          <p:nvPr>
-            <p:ph idx="1"/>
-          </p:nvPr>
-        </p:nvSpPr>
-        <p:spPr/>
-        <p:txBody>
-          <a:bodyPr/>
-          <a:lstStyle/>
-          <a:p>
-            <a:pPr>
-              <a:buNone/>
-            </a:pPr>
-            <a:r>
-              <a:rPr lang="en-US" dirty="0"/>
-              <a:t>A 60W light bulb is allowed to burn for 3600s. How much energy has been used?</a:t>
-            </a:r>
-          </a:p>
-          <a:p>
-            <a:pPr marL="514350" indent="-514350">
-              <a:buFont typeface="+mj-lt"/>
-              <a:buAutoNum type="alphaLcParenR"/>
-            </a:pPr>
-            <a:r>
-              <a:rPr lang="en-US" dirty="0"/>
-              <a:t>36000J</a:t>
-            </a:r>
-          </a:p>
-          <a:p>
-            <a:pPr marL="514350" indent="-514350">
-              <a:buFont typeface="+mj-lt"/>
-              <a:buAutoNum type="alphaLcParenR"/>
-            </a:pPr>
-            <a:r>
-              <a:rPr lang="en-US" dirty="0"/>
-              <a:t>72000J</a:t>
-            </a:r>
-          </a:p>
-          <a:p>
-            <a:pPr marL="514350" indent="-514350">
-              <a:buFont typeface="+mj-lt"/>
-              <a:buAutoNum type="alphaLcParenR"/>
-            </a:pPr>
-            <a:r>
-              <a:rPr lang="en-US" dirty="0"/>
-              <a:t>144000J</a:t>
-            </a:r>
-          </a:p>
-          <a:p>
-            <a:pPr marL="514350" indent="-514350">
-              <a:buFont typeface="+mj-lt"/>
-              <a:buAutoNum type="alphaLcParenR"/>
-            </a:pPr>
-            <a:r>
-              <a:rPr lang="en-US" dirty="0"/>
-              <a:t>216000J</a:t>
-            </a:r>
-          </a:p>
-          <a:p>
-            <a:pPr marL="514350" indent="-514350">
-              <a:buFont typeface="+mj-lt"/>
-              <a:buAutoNum type="alphaLcParenR"/>
-            </a:pPr>
-            <a:r>
-              <a:rPr lang="en-US" dirty="0"/>
-              <a:t>5400000J</a:t>
-            </a:r>
-          </a:p>
-          <a:p>
-            <a:pPr>
-              <a:buNone/>
-            </a:pPr>
-            <a:endParaRPr lang="en-US" dirty="0"/>
-          </a:p>
-        </p:txBody>
-      </p:sp>
-      <p:sp>
-        <p:nvSpPr>
-          <p:cNvPr id="4" name="Slide Number Placeholder 3"/>
-          <p:cNvSpPr>
-            <a:spLocks noGrp="1"/>
-          </p:cNvSpPr>
-          <p:nvPr>
-            <p:ph type="sldNum" sz="quarter" idx="12"/>
-          </p:nvPr>
-        </p:nvSpPr>
-        <p:spPr/>
-        <p:txBody>
-          <a:bodyPr/>
-          <a:lstStyle/>
-          <a:p>
-            <a:pPr>
-              <a:defRPr/>
-            </a:pPr>
-            <a:fld id="{64137B81-8888-4253-92EC-0AED2A590749}" type="slidenum">
-              <a:rPr lang="en-US" smtClean="0"/>
-              <a:pPr>
-                <a:defRPr/>
-              </a:pPr>
-              <a:t>28</a:t>
-            </a:fld>
-            <a:endParaRPr lang="en-US"/>
-          </a:p>
-        </p:txBody>
-      </p:sp>
-    </p:spTree>
-  </p:cSld>
-  <p:clrMapOvr>
-    <a:masterClrMapping/>
-  </p:clrMapOvr>
-</p:sld>
-</file>
-
 <file path=ppt/slides/slide29.xml><?xml version="1.0" encoding="utf-8"?>
 <p:sld xmlns:a="http://schemas.openxmlformats.org/drawingml/2006/main" xmlns:r="http://schemas.openxmlformats.org/officeDocument/2006/relationships" xmlns:p="http://schemas.openxmlformats.org/presentationml/2006/main">
   <p:cSld>
@@ -41780,7 +41980,7 @@
           <a:p>
             <a:r>
               <a:rPr lang="en-US" dirty="0"/>
-              <a:t>Question 223.4.5.1</a:t>
+              <a:t>Question  223.4.5     123.22.1</a:t>
             </a:r>
           </a:p>
         </p:txBody>
@@ -41800,49 +42000,69 @@
           <a:bodyPr/>
           <a:lstStyle/>
           <a:p>
-            <a:pPr marL="0" indent="0">
+            <a:pPr>
               <a:buNone/>
             </a:pPr>
             <a:r>
               <a:rPr lang="en-US" dirty="0"/>
-              <a:t>If the index of refraction is  n = 2, how fast is the light going in the material medium?</a:t>
+              <a:t>A 60W light bulb is allowed to burn for 3600s. How much energy has been used?</a:t>
             </a:r>
           </a:p>
           <a:p>
             <a:pPr marL="514350" indent="-514350">
+              <a:buFont typeface="+mj-lt"/>
               <a:buAutoNum type="alphaLcParenR"/>
             </a:pPr>
             <a:r>
               <a:rPr lang="en-US" dirty="0"/>
-              <a:t>Twice the speed of light</a:t>
+              <a:t>36000J</a:t>
             </a:r>
           </a:p>
           <a:p>
             <a:pPr marL="514350" indent="-514350">
+              <a:buFont typeface="+mj-lt"/>
               <a:buAutoNum type="alphaLcParenR"/>
             </a:pPr>
             <a:r>
               <a:rPr lang="en-US" dirty="0"/>
-              <a:t>Half the speed of light</a:t>
+              <a:t>72000J</a:t>
             </a:r>
           </a:p>
           <a:p>
             <a:pPr marL="514350" indent="-514350">
+              <a:buFont typeface="+mj-lt"/>
               <a:buAutoNum type="alphaLcParenR"/>
             </a:pPr>
             <a:r>
               <a:rPr lang="en-US" dirty="0"/>
-              <a:t>A quarter the speed of light</a:t>
+              <a:t>144000J</a:t>
             </a:r>
           </a:p>
           <a:p>
             <a:pPr marL="514350" indent="-514350">
+              <a:buFont typeface="+mj-lt"/>
               <a:buAutoNum type="alphaLcParenR"/>
             </a:pPr>
             <a:r>
               <a:rPr lang="en-US" dirty="0"/>
-              <a:t>1/16 the speed of light</a:t>
+              <a:t>216000J</a:t>
             </a:r>
+          </a:p>
+          <a:p>
+            <a:pPr marL="514350" indent="-514350">
+              <a:buFont typeface="+mj-lt"/>
+              <a:buAutoNum type="alphaLcParenR"/>
+            </a:pPr>
+            <a:r>
+              <a:rPr lang="en-US" dirty="0"/>
+              <a:t>5400000J</a:t>
+            </a:r>
+          </a:p>
+          <a:p>
+            <a:pPr>
+              <a:buNone/>
+            </a:pPr>
+            <a:endParaRPr lang="en-US" dirty="0"/>
           </a:p>
         </p:txBody>
       </p:sp>
@@ -41876,11 +42096,6 @@
         </p:txBody>
       </p:sp>
     </p:spTree>
-    <p:extLst>
-      <p:ext uri="{BB962C8B-B14F-4D97-AF65-F5344CB8AC3E}">
-        <p14:creationId xmlns:p14="http://schemas.microsoft.com/office/powerpoint/2010/main" val="2285328972"/>
-      </p:ext>
-    </p:extLst>
   </p:cSld>
   <p:clrMapOvr>
     <a:masterClrMapping/>
@@ -42049,6 +42264,148 @@
       </p:grpSpPr>
       <p:sp>
         <p:nvSpPr>
+          <p:cNvPr id="2" name="Title 1"/>
+          <p:cNvSpPr>
+            <a:spLocks noGrp="1"/>
+          </p:cNvSpPr>
+          <p:nvPr>
+            <p:ph type="title"/>
+          </p:nvPr>
+        </p:nvSpPr>
+        <p:spPr/>
+        <p:txBody>
+          <a:bodyPr/>
+          <a:lstStyle/>
+          <a:p>
+            <a:r>
+              <a:rPr lang="en-US" dirty="0"/>
+              <a:t>Question 223.4.5.1</a:t>
+            </a:r>
+          </a:p>
+        </p:txBody>
+      </p:sp>
+      <p:sp>
+        <p:nvSpPr>
+          <p:cNvPr id="3" name="Content Placeholder 2"/>
+          <p:cNvSpPr>
+            <a:spLocks noGrp="1"/>
+          </p:cNvSpPr>
+          <p:nvPr>
+            <p:ph idx="1"/>
+          </p:nvPr>
+        </p:nvSpPr>
+        <p:spPr/>
+        <p:txBody>
+          <a:bodyPr/>
+          <a:lstStyle/>
+          <a:p>
+            <a:pPr marL="0" indent="0">
+              <a:buNone/>
+            </a:pPr>
+            <a:r>
+              <a:rPr lang="en-US" dirty="0"/>
+              <a:t>If the index of refraction is  n = 2, how fast is the light going in the material medium?</a:t>
+            </a:r>
+          </a:p>
+          <a:p>
+            <a:pPr marL="514350" indent="-514350">
+              <a:buAutoNum type="alphaLcParenR"/>
+            </a:pPr>
+            <a:r>
+              <a:rPr lang="en-US" dirty="0"/>
+              <a:t>Twice the speed of light</a:t>
+            </a:r>
+          </a:p>
+          <a:p>
+            <a:pPr marL="514350" indent="-514350">
+              <a:buAutoNum type="alphaLcParenR"/>
+            </a:pPr>
+            <a:r>
+              <a:rPr lang="en-US" dirty="0"/>
+              <a:t>Half the speed of light</a:t>
+            </a:r>
+          </a:p>
+          <a:p>
+            <a:pPr marL="514350" indent="-514350">
+              <a:buAutoNum type="alphaLcParenR"/>
+            </a:pPr>
+            <a:r>
+              <a:rPr lang="en-US" dirty="0"/>
+              <a:t>A quarter the speed of light</a:t>
+            </a:r>
+          </a:p>
+          <a:p>
+            <a:pPr marL="514350" indent="-514350">
+              <a:buAutoNum type="alphaLcParenR"/>
+            </a:pPr>
+            <a:r>
+              <a:rPr lang="en-US" dirty="0"/>
+              <a:t>1/16 the speed of light</a:t>
+            </a:r>
+          </a:p>
+        </p:txBody>
+      </p:sp>
+      <p:sp>
+        <p:nvSpPr>
+          <p:cNvPr id="4" name="Slide Number Placeholder 3"/>
+          <p:cNvSpPr>
+            <a:spLocks noGrp="1"/>
+          </p:cNvSpPr>
+          <p:nvPr>
+            <p:ph type="sldNum" sz="quarter" idx="12"/>
+          </p:nvPr>
+        </p:nvSpPr>
+        <p:spPr/>
+        <p:txBody>
+          <a:bodyPr/>
+          <a:lstStyle/>
+          <a:p>
+            <a:pPr>
+              <a:defRPr/>
+            </a:pPr>
+            <a:fld id="{64137B81-8888-4253-92EC-0AED2A590749}" type="slidenum">
+              <a:rPr lang="en-US" smtClean="0"/>
+              <a:pPr>
+                <a:defRPr/>
+              </a:pPr>
+              <a:t>30</a:t>
+            </a:fld>
+            <a:endParaRPr lang="en-US"/>
+          </a:p>
+        </p:txBody>
+      </p:sp>
+    </p:spTree>
+    <p:extLst>
+      <p:ext uri="{BB962C8B-B14F-4D97-AF65-F5344CB8AC3E}">
+        <p14:creationId xmlns:p14="http://schemas.microsoft.com/office/powerpoint/2010/main" val="2285328972"/>
+      </p:ext>
+    </p:extLst>
+  </p:cSld>
+  <p:clrMapOvr>
+    <a:masterClrMapping/>
+  </p:clrMapOvr>
+</p:sld>
+</file>
+
+<file path=ppt/slides/slide31.xml><?xml version="1.0" encoding="utf-8"?>
+<p:sld xmlns:a="http://schemas.openxmlformats.org/drawingml/2006/main" xmlns:r="http://schemas.openxmlformats.org/officeDocument/2006/relationships" xmlns:p="http://schemas.openxmlformats.org/presentationml/2006/main">
+  <p:cSld>
+    <p:spTree>
+      <p:nvGrpSpPr>
+        <p:cNvPr id="1" name=""/>
+        <p:cNvGrpSpPr/>
+        <p:nvPr/>
+      </p:nvGrpSpPr>
+      <p:grpSpPr>
+        <a:xfrm>
+          <a:off x="0" y="0"/>
+          <a:ext cx="0" cy="0"/>
+          <a:chOff x="0" y="0"/>
+          <a:chExt cx="0" cy="0"/>
+        </a:xfrm>
+      </p:grpSpPr>
+      <p:sp>
+        <p:nvSpPr>
           <p:cNvPr id="533505" name="Title 3"/>
           <p:cNvSpPr>
             <a:spLocks noGrp="1"/>
@@ -42156,7 +42513,7 @@
 </p:sld>
 </file>
 
-<file path=ppt/slides/slide31.xml><?xml version="1.0" encoding="utf-8"?>
+<file path=ppt/slides/slide32.xml><?xml version="1.0" encoding="utf-8"?>
 <p:sld xmlns:a="http://schemas.openxmlformats.org/drawingml/2006/main" xmlns:r="http://schemas.openxmlformats.org/officeDocument/2006/relationships" xmlns:p="http://schemas.openxmlformats.org/presentationml/2006/main">
   <p:cSld>
     <p:spTree>
@@ -42267,7 +42624,7 @@
             <a:fld id="{B7EC24E5-89AC-43BC-95C0-434346ACF2A9}" type="slidenum">
               <a:rPr lang="en-US" smtClean="0"/>
               <a:pPr/>
-              <a:t>31</a:t>
+              <a:t>32</a:t>
             </a:fld>
             <a:endParaRPr lang="en-US"/>
           </a:p>
@@ -42281,7 +42638,7 @@
 </p:sld>
 </file>
 
-<file path=ppt/slides/slide32.xml><?xml version="1.0" encoding="utf-8"?>
+<file path=ppt/slides/slide33.xml><?xml version="1.0" encoding="utf-8"?>
 <p:sld xmlns:a="http://schemas.openxmlformats.org/drawingml/2006/main" xmlns:r="http://schemas.openxmlformats.org/officeDocument/2006/relationships" xmlns:p="http://schemas.openxmlformats.org/presentationml/2006/main">
   <p:cSld>
     <p:spTree>
@@ -42410,7 +42767,7 @@
             <a:fld id="{103EBA7D-9A04-4522-9A2F-EC8F4813A80C}" type="slidenum">
               <a:rPr lang="en-US" smtClean="0"/>
               <a:pPr/>
-              <a:t>32</a:t>
+              <a:t>33</a:t>
             </a:fld>
             <a:endParaRPr lang="en-US"/>
           </a:p>
@@ -42424,7 +42781,7 @@
 </p:sld>
 </file>
 
-<file path=ppt/slides/slide33.xml><?xml version="1.0" encoding="utf-8"?>
+<file path=ppt/slides/slide34.xml><?xml version="1.0" encoding="utf-8"?>
 <p:sld xmlns:a="http://schemas.openxmlformats.org/drawingml/2006/main" xmlns:r="http://schemas.openxmlformats.org/officeDocument/2006/relationships" xmlns:p="http://schemas.openxmlformats.org/presentationml/2006/main">
   <p:cSld>
     <p:spTree>
@@ -42642,7 +42999,7 @@
             <a:fld id="{5B5A48A1-FA10-4297-9A45-A4DF9393E8E1}" type="slidenum">
               <a:rPr lang="en-US" smtClean="0"/>
               <a:pPr/>
-              <a:t>33</a:t>
+              <a:t>34</a:t>
             </a:fld>
             <a:endParaRPr lang="en-US"/>
           </a:p>
@@ -42720,7 +43077,7 @@
 </p:sld>
 </file>
 
-<file path=ppt/slides/slide34.xml><?xml version="1.0" encoding="utf-8"?>
+<file path=ppt/slides/slide35.xml><?xml version="1.0" encoding="utf-8"?>
 <p:sld xmlns:a="http://schemas.openxmlformats.org/drawingml/2006/main" xmlns:r="http://schemas.openxmlformats.org/officeDocument/2006/relationships" xmlns:p="http://schemas.openxmlformats.org/presentationml/2006/main">
   <p:cSld>
     <p:spTree>
@@ -42840,7 +43197,7 @@
 </p:sld>
 </file>
 
-<file path=ppt/slides/slide35.xml><?xml version="1.0" encoding="utf-8"?>
+<file path=ppt/slides/slide36.xml><?xml version="1.0" encoding="utf-8"?>
 <p:sld xmlns:a="http://schemas.openxmlformats.org/drawingml/2006/main" xmlns:r="http://schemas.openxmlformats.org/officeDocument/2006/relationships" xmlns:p="http://schemas.openxmlformats.org/presentationml/2006/main">
   <p:cSld>
     <p:spTree>
@@ -43476,7 +43833,7 @@
 </p:sld>
 </file>
 
-<file path=ppt/slides/slide36.xml><?xml version="1.0" encoding="utf-8"?>
+<file path=ppt/slides/slide37.xml><?xml version="1.0" encoding="utf-8"?>
 <p:sld xmlns:a="http://schemas.openxmlformats.org/drawingml/2006/main" xmlns:r="http://schemas.openxmlformats.org/officeDocument/2006/relationships" xmlns:p="http://schemas.openxmlformats.org/presentationml/2006/main">
   <p:cSld>
     <p:spTree>
@@ -43687,7 +44044,7 @@
 </p:sld>
 </file>
 
-<file path=ppt/slides/slide37.xml><?xml version="1.0" encoding="utf-8"?>
+<file path=ppt/slides/slide38.xml><?xml version="1.0" encoding="utf-8"?>
 <p:sld xmlns:a="http://schemas.openxmlformats.org/drawingml/2006/main" xmlns:r="http://schemas.openxmlformats.org/officeDocument/2006/relationships" xmlns:p="http://schemas.openxmlformats.org/presentationml/2006/main">
   <p:cSld>
     <p:spTree>
@@ -45512,7 +45869,7 @@
 </p:sld>
 </file>
 
-<file path=ppt/slides/slide38.xml><?xml version="1.0" encoding="utf-8"?>
+<file path=ppt/slides/slide39.xml><?xml version="1.0" encoding="utf-8"?>
 <p:sld xmlns:a="http://schemas.openxmlformats.org/drawingml/2006/main" xmlns:r="http://schemas.openxmlformats.org/officeDocument/2006/relationships" xmlns:p="http://schemas.openxmlformats.org/presentationml/2006/main">
   <p:cSld>
     <p:spTree>
@@ -45593,119 +45950,6 @@
             <a:r>
               <a:rPr lang="en-US" b="1" dirty="0"/>
               <a:t>b) 10dB</a:t>
-            </a:r>
-          </a:p>
-          <a:p>
-            <a:pPr>
-              <a:buFontTx/>
-              <a:buNone/>
-            </a:pPr>
-            <a:r>
-              <a:rPr lang="en-US" b="1" dirty="0"/>
-              <a:t>c) 120dB</a:t>
-            </a:r>
-          </a:p>
-          <a:p>
-            <a:pPr>
-              <a:buFontTx/>
-              <a:buNone/>
-            </a:pPr>
-            <a:r>
-              <a:rPr lang="en-US" b="1" dirty="0"/>
-              <a:t>d) 150dB</a:t>
-            </a:r>
-          </a:p>
-        </p:txBody>
-      </p:sp>
-    </p:spTree>
-  </p:cSld>
-  <p:clrMapOvr>
-    <a:masterClrMapping/>
-  </p:clrMapOvr>
-</p:sld>
-</file>
-
-<file path=ppt/slides/slide39.xml><?xml version="1.0" encoding="utf-8"?>
-<p:sld xmlns:a="http://schemas.openxmlformats.org/drawingml/2006/main" xmlns:r="http://schemas.openxmlformats.org/officeDocument/2006/relationships" xmlns:p="http://schemas.openxmlformats.org/presentationml/2006/main">
-  <p:cSld>
-    <p:spTree>
-      <p:nvGrpSpPr>
-        <p:cNvPr id="1" name=""/>
-        <p:cNvGrpSpPr/>
-        <p:nvPr/>
-      </p:nvGrpSpPr>
-      <p:grpSpPr>
-        <a:xfrm>
-          <a:off x="0" y="0"/>
-          <a:ext cx="0" cy="0"/>
-          <a:chOff x="0" y="0"/>
-          <a:chExt cx="0" cy="0"/>
-        </a:xfrm>
-      </p:grpSpPr>
-      <p:sp>
-        <p:nvSpPr>
-          <p:cNvPr id="546817" name="Title 1"/>
-          <p:cNvSpPr>
-            <a:spLocks noGrp="1"/>
-          </p:cNvSpPr>
-          <p:nvPr>
-            <p:ph type="title"/>
-          </p:nvPr>
-        </p:nvSpPr>
-        <p:spPr/>
-        <p:txBody>
-          <a:bodyPr/>
-          <a:lstStyle/>
-          <a:p>
-            <a:r>
-              <a:rPr lang="en-US" dirty="0"/>
-              <a:t>Question 223.4.12 123.22.8</a:t>
-            </a:r>
-          </a:p>
-        </p:txBody>
-      </p:sp>
-      <p:sp>
-        <p:nvSpPr>
-          <p:cNvPr id="546818" name="Content Placeholder 2"/>
-          <p:cNvSpPr>
-            <a:spLocks noGrp="1"/>
-          </p:cNvSpPr>
-          <p:nvPr>
-            <p:ph idx="1"/>
-          </p:nvPr>
-        </p:nvSpPr>
-        <p:spPr/>
-        <p:txBody>
-          <a:bodyPr/>
-          <a:lstStyle/>
-          <a:p>
-            <a:pPr>
-              <a:buFontTx/>
-              <a:buNone/>
-            </a:pPr>
-            <a:r>
-              <a:rPr lang="en-US" b="1" dirty="0"/>
-              <a:t>Suppose I have a loud speaker and 10m away from that loud speaker I measure an intensity of 0.01 W /m². What is the sound level? </a:t>
-            </a:r>
-          </a:p>
-          <a:p>
-            <a:pPr>
-              <a:buFontTx/>
-              <a:buNone/>
-            </a:pPr>
-            <a:r>
-              <a:rPr lang="en-US" b="1" dirty="0"/>
-              <a:t>a)  30dB</a:t>
-            </a:r>
-          </a:p>
-          <a:p>
-            <a:pPr>
-              <a:buFontTx/>
-              <a:buNone/>
-            </a:pPr>
-            <a:r>
-              <a:rPr lang="en-US" b="1" dirty="0"/>
-              <a:t>b) 100dB</a:t>
             </a:r>
           </a:p>
           <a:p>
@@ -45837,6 +46081,119 @@
       </p:grpSpPr>
       <p:sp>
         <p:nvSpPr>
+          <p:cNvPr id="546817" name="Title 1"/>
+          <p:cNvSpPr>
+            <a:spLocks noGrp="1"/>
+          </p:cNvSpPr>
+          <p:nvPr>
+            <p:ph type="title"/>
+          </p:nvPr>
+        </p:nvSpPr>
+        <p:spPr/>
+        <p:txBody>
+          <a:bodyPr/>
+          <a:lstStyle/>
+          <a:p>
+            <a:r>
+              <a:rPr lang="en-US" dirty="0"/>
+              <a:t>Question 223.4.12 123.22.8</a:t>
+            </a:r>
+          </a:p>
+        </p:txBody>
+      </p:sp>
+      <p:sp>
+        <p:nvSpPr>
+          <p:cNvPr id="546818" name="Content Placeholder 2"/>
+          <p:cNvSpPr>
+            <a:spLocks noGrp="1"/>
+          </p:cNvSpPr>
+          <p:nvPr>
+            <p:ph idx="1"/>
+          </p:nvPr>
+        </p:nvSpPr>
+        <p:spPr/>
+        <p:txBody>
+          <a:bodyPr/>
+          <a:lstStyle/>
+          <a:p>
+            <a:pPr>
+              <a:buFontTx/>
+              <a:buNone/>
+            </a:pPr>
+            <a:r>
+              <a:rPr lang="en-US" b="1" dirty="0"/>
+              <a:t>Suppose I have a loud speaker and 10m away from that loud speaker I measure an intensity of 0.01 W /m². What is the sound level? </a:t>
+            </a:r>
+          </a:p>
+          <a:p>
+            <a:pPr>
+              <a:buFontTx/>
+              <a:buNone/>
+            </a:pPr>
+            <a:r>
+              <a:rPr lang="en-US" b="1" dirty="0"/>
+              <a:t>a)  30dB</a:t>
+            </a:r>
+          </a:p>
+          <a:p>
+            <a:pPr>
+              <a:buFontTx/>
+              <a:buNone/>
+            </a:pPr>
+            <a:r>
+              <a:rPr lang="en-US" b="1" dirty="0"/>
+              <a:t>b) 100dB</a:t>
+            </a:r>
+          </a:p>
+          <a:p>
+            <a:pPr>
+              <a:buFontTx/>
+              <a:buNone/>
+            </a:pPr>
+            <a:r>
+              <a:rPr lang="en-US" b="1" dirty="0"/>
+              <a:t>c) 120dB</a:t>
+            </a:r>
+          </a:p>
+          <a:p>
+            <a:pPr>
+              <a:buFontTx/>
+              <a:buNone/>
+            </a:pPr>
+            <a:r>
+              <a:rPr lang="en-US" b="1" dirty="0"/>
+              <a:t>d) 150dB</a:t>
+            </a:r>
+          </a:p>
+        </p:txBody>
+      </p:sp>
+    </p:spTree>
+  </p:cSld>
+  <p:clrMapOvr>
+    <a:masterClrMapping/>
+  </p:clrMapOvr>
+</p:sld>
+</file>
+
+<file path=ppt/slides/slide41.xml><?xml version="1.0" encoding="utf-8"?>
+<p:sld xmlns:a="http://schemas.openxmlformats.org/drawingml/2006/main" xmlns:r="http://schemas.openxmlformats.org/officeDocument/2006/relationships" xmlns:p="http://schemas.openxmlformats.org/presentationml/2006/main">
+  <p:cSld>
+    <p:spTree>
+      <p:nvGrpSpPr>
+        <p:cNvPr id="1" name=""/>
+        <p:cNvGrpSpPr/>
+        <p:nvPr/>
+      </p:nvGrpSpPr>
+      <p:grpSpPr>
+        <a:xfrm>
+          <a:off x="0" y="0"/>
+          <a:ext cx="0" cy="0"/>
+          <a:chOff x="0" y="0"/>
+          <a:chExt cx="0" cy="0"/>
+        </a:xfrm>
+      </p:grpSpPr>
+      <p:sp>
+        <p:nvSpPr>
           <p:cNvPr id="547841" name="Title 1"/>
           <p:cNvSpPr>
             <a:spLocks noGrp="1"/>
@@ -45941,7 +46298,7 @@
 </p:sld>
 </file>
 
-<file path=ppt/slides/slide41.xml><?xml version="1.0" encoding="utf-8"?>
+<file path=ppt/slides/slide42.xml><?xml version="1.0" encoding="utf-8"?>
 <p:sld xmlns:a="http://schemas.openxmlformats.org/drawingml/2006/main" xmlns:r="http://schemas.openxmlformats.org/officeDocument/2006/relationships" xmlns:p="http://schemas.openxmlformats.org/presentationml/2006/main">
   <p:cSld>
     <p:spTree>
@@ -46058,7 +46415,7 @@
 </p:sld>
 </file>
 
-<file path=ppt/slides/slide42.xml><?xml version="1.0" encoding="utf-8"?>
+<file path=ppt/slides/slide43.xml><?xml version="1.0" encoding="utf-8"?>
 <p:sld xmlns:a="http://schemas.openxmlformats.org/drawingml/2006/main" xmlns:r="http://schemas.openxmlformats.org/officeDocument/2006/relationships" xmlns:p="http://schemas.openxmlformats.org/presentationml/2006/main">
   <p:cSld>
     <p:spTree>
@@ -46175,7 +46532,7 @@
 </p:sld>
 </file>
 
-<file path=ppt/slides/slide43.xml><?xml version="1.0" encoding="utf-8"?>
+<file path=ppt/slides/slide44.xml><?xml version="1.0" encoding="utf-8"?>
 <p:sld xmlns:a="http://schemas.openxmlformats.org/drawingml/2006/main" xmlns:r="http://schemas.openxmlformats.org/officeDocument/2006/relationships" xmlns:p="http://schemas.openxmlformats.org/presentationml/2006/main">
   <p:cSld>
     <p:spTree>
@@ -46290,7 +46647,7 @@
 </p:sld>
 </file>
 
-<file path=ppt/slides/slide44.xml><?xml version="1.0" encoding="utf-8"?>
+<file path=ppt/slides/slide45.xml><?xml version="1.0" encoding="utf-8"?>
 <p:sld xmlns:a="http://schemas.openxmlformats.org/drawingml/2006/main" xmlns:r="http://schemas.openxmlformats.org/officeDocument/2006/relationships" xmlns:p="http://schemas.openxmlformats.org/presentationml/2006/main">
   <p:cSld>
     <p:spTree>
@@ -46423,7 +46780,7 @@
 </p:sld>
 </file>
 
-<file path=ppt/slides/slide45.xml><?xml version="1.0" encoding="utf-8"?>
+<file path=ppt/slides/slide46.xml><?xml version="1.0" encoding="utf-8"?>
 <p:sld xmlns:a="http://schemas.openxmlformats.org/drawingml/2006/main" xmlns:r="http://schemas.openxmlformats.org/officeDocument/2006/relationships" xmlns:p="http://schemas.openxmlformats.org/presentationml/2006/main">
   <p:cSld>
     <p:spTree>
@@ -46510,7 +46867,7 @@
 </p:sld>
 </file>
 
-<file path=ppt/slides/slide46.xml><?xml version="1.0" encoding="utf-8"?>
+<file path=ppt/slides/slide47.xml><?xml version="1.0" encoding="utf-8"?>
 <p:sld xmlns:a="http://schemas.openxmlformats.org/drawingml/2006/main" xmlns:r="http://schemas.openxmlformats.org/officeDocument/2006/relationships" xmlns:p="http://schemas.openxmlformats.org/presentationml/2006/main">
   <p:cSld>
     <p:spTree>
@@ -46733,7 +47090,7 @@
 </p:sld>
 </file>
 
-<file path=ppt/slides/slide47.xml><?xml version="1.0" encoding="utf-8"?>
+<file path=ppt/slides/slide48.xml><?xml version="1.0" encoding="utf-8"?>
 <p:sld xmlns:a="http://schemas.openxmlformats.org/drawingml/2006/main" xmlns:r="http://schemas.openxmlformats.org/officeDocument/2006/relationships" xmlns:p="http://schemas.openxmlformats.org/presentationml/2006/main">
   <p:cSld>
     <p:spTree>

</xml_diff>